<commit_message>
Session 3 and 4 updates
</commit_message>
<xml_diff>
--- a/slides/Lecture_03_DiscreteDeterministic.pptx
+++ b/slides/Lecture_03_DiscreteDeterministic.pptx
@@ -215,7 +215,7 @@
           <a:p>
             <a:fld id="{0D51ACCD-121E-4361-9E2C-AF07B06B2BA8}" type="datetimeFigureOut">
               <a:rPr lang="en-GB" smtClean="0"/>
-              <a:t>02/09/2024</a:t>
+              <a:t>08/09/2024</a:t>
             </a:fld>
             <a:endParaRPr lang="en-GB"/>
           </a:p>
@@ -2565,8 +2565,8 @@
           </a:p>
         </p:txBody>
       </p:sp>
-      <mc:AlternateContent xmlns:mc="http://schemas.openxmlformats.org/markup-compatibility/2006">
-        <mc:Choice xmlns:a14="http://schemas.microsoft.com/office/drawing/2010/main" Requires="a14">
+      <mc:AlternateContent xmlns:mc="http://schemas.openxmlformats.org/markup-compatibility/2006" xmlns:a14="http://schemas.microsoft.com/office/drawing/2010/main">
+        <mc:Choice Requires="a14">
           <p:sp>
             <p:nvSpPr>
               <p:cNvPr id="3" name="Content Placeholder 2"/>
@@ -2959,7 +2959,7 @@
             </p:txBody>
           </p:sp>
         </mc:Choice>
-        <mc:Fallback>
+        <mc:Fallback xmlns="">
           <p:sp>
             <p:nvSpPr>
               <p:cNvPr id="3" name="Content Placeholder 2"/>
@@ -4110,13 +4110,13 @@
               <a:t> </a:t>
             </a:r>
             <a:r>
-              <a:rPr sz="1600" dirty="0">
+              <a:rPr lang="en-GB" sz="1600" dirty="0">
                 <a:solidFill>
                   <a:srgbClr val="40A070"/>
                 </a:solidFill>
                 <a:latin typeface="Courier"/>
               </a:rPr>
-              <a:t>1</a:t>
+              <a:t>2</a:t>
             </a:r>
             <a:r>
               <a:rPr sz="1600" dirty="0">
@@ -4158,40 +4158,7 @@
               <a:rPr sz="1600" dirty="0">
                 <a:latin typeface="Courier"/>
               </a:rPr>
-              <a:t>) </a:t>
-            </a:r>
-            <a:r>
-              <a:rPr sz="1600" dirty="0">
-                <a:solidFill>
-                  <a:srgbClr val="666666"/>
-                </a:solidFill>
-                <a:latin typeface="Courier"/>
-              </a:rPr>
-              <a:t>-</a:t>
-            </a:r>
-            <a:r>
-              <a:rPr sz="1600" dirty="0">
-                <a:solidFill>
-                  <a:srgbClr val="4070A0"/>
-                </a:solidFill>
-                <a:latin typeface="Courier"/>
-              </a:rPr>
-              <a:t> </a:t>
-            </a:r>
-            <a:r>
-              <a:rPr sz="1600" dirty="0">
-                <a:solidFill>
-                  <a:srgbClr val="40A070"/>
-                </a:solidFill>
-                <a:latin typeface="Courier"/>
-              </a:rPr>
-              <a:t>1</a:t>
-            </a:r>
-            <a:r>
-              <a:rPr sz="1600" dirty="0">
-                <a:latin typeface="Courier"/>
-              </a:rPr>
-              <a:t>)){</a:t>
+              <a:t>))){</a:t>
             </a:r>
             <a:endParaRPr lang="en-GB" sz="1600" dirty="0">
               <a:latin typeface="Courier"/>
@@ -4225,16 +4192,82 @@
               <a:t>[</a:t>
             </a:r>
             <a:r>
+              <a:rPr sz="1600">
+                <a:latin typeface="Courier"/>
+              </a:rPr>
+              <a:t>i,] </a:t>
+            </a:r>
+            <a:r>
+              <a:rPr sz="1600" dirty="0">
+                <a:latin typeface="Courier"/>
+              </a:rPr>
+              <a:t>&lt;-</a:t>
+            </a:r>
+            <a:r>
+              <a:rPr sz="1600" dirty="0">
+                <a:solidFill>
+                  <a:srgbClr val="4070A0"/>
+                </a:solidFill>
+                <a:latin typeface="Courier"/>
+              </a:rPr>
+              <a:t> </a:t>
+            </a:r>
+            <a:r>
               <a:rPr sz="1600" dirty="0" err="1">
                 <a:latin typeface="Courier"/>
               </a:rPr>
+              <a:t>y_sir</a:t>
+            </a:r>
+            <a:r>
+              <a:rPr sz="1600" dirty="0">
+                <a:latin typeface="Courier"/>
+              </a:rPr>
+              <a:t>[</a:t>
+            </a:r>
+            <a:r>
+              <a:rPr lang="en-GB" sz="1600" dirty="0" err="1">
+                <a:latin typeface="Courier"/>
+              </a:rPr>
               <a:t>i</a:t>
             </a:r>
             <a:r>
+              <a:rPr lang="en-GB" sz="1600" dirty="0">
+                <a:latin typeface="Courier"/>
+              </a:rPr>
+              <a:t> </a:t>
+            </a:r>
+            <a:r>
+              <a:rPr lang="en-GB" sz="1600" dirty="0">
+                <a:solidFill>
+                  <a:srgbClr val="666666"/>
+                </a:solidFill>
+                <a:latin typeface="Courier"/>
+              </a:rPr>
+              <a:t>-</a:t>
+            </a:r>
+            <a:r>
+              <a:rPr lang="en-GB" sz="1600" dirty="0">
+                <a:solidFill>
+                  <a:srgbClr val="4070A0"/>
+                </a:solidFill>
+                <a:latin typeface="Courier"/>
+              </a:rPr>
+              <a:t> </a:t>
+            </a:r>
+            <a:r>
+              <a:rPr lang="en-GB" sz="1600" dirty="0">
+                <a:solidFill>
+                  <a:srgbClr val="40A070"/>
+                </a:solidFill>
+                <a:latin typeface="Courier"/>
+              </a:rPr>
+              <a:t>1</a:t>
+            </a:r>
+            <a:r>
               <a:rPr sz="1600" dirty="0">
                 <a:latin typeface="Courier"/>
               </a:rPr>
-              <a:t> </a:t>
+              <a:t>,] </a:t>
             </a:r>
             <a:r>
               <a:rPr sz="1600" dirty="0">
@@ -4245,6 +4278,11 @@
               </a:rPr>
               <a:t>+</a:t>
             </a:r>
+            <a:br>
+              <a:rPr sz="1600" dirty="0">
+                <a:latin typeface="Courier"/>
+              </a:rPr>
+            </a:br>
             <a:r>
               <a:rPr sz="1600" dirty="0">
                 <a:solidFill>
@@ -4252,77 +4290,6 @@
                 </a:solidFill>
                 <a:latin typeface="Courier"/>
               </a:rPr>
-              <a:t> </a:t>
-            </a:r>
-            <a:r>
-              <a:rPr sz="1600" dirty="0">
-                <a:solidFill>
-                  <a:srgbClr val="40A070"/>
-                </a:solidFill>
-                <a:latin typeface="Courier"/>
-              </a:rPr>
-              <a:t>1</a:t>
-            </a:r>
-            <a:r>
-              <a:rPr sz="1600" dirty="0">
-                <a:latin typeface="Courier"/>
-              </a:rPr>
-              <a:t>,] &lt;-</a:t>
-            </a:r>
-            <a:r>
-              <a:rPr sz="1600" dirty="0">
-                <a:solidFill>
-                  <a:srgbClr val="4070A0"/>
-                </a:solidFill>
-                <a:latin typeface="Courier"/>
-              </a:rPr>
-              <a:t> </a:t>
-            </a:r>
-            <a:r>
-              <a:rPr sz="1600" dirty="0" err="1">
-                <a:latin typeface="Courier"/>
-              </a:rPr>
-              <a:t>y_sir</a:t>
-            </a:r>
-            <a:r>
-              <a:rPr sz="1600" dirty="0">
-                <a:latin typeface="Courier"/>
-              </a:rPr>
-              <a:t>[</a:t>
-            </a:r>
-            <a:r>
-              <a:rPr sz="1600" dirty="0" err="1">
-                <a:latin typeface="Courier"/>
-              </a:rPr>
-              <a:t>i</a:t>
-            </a:r>
-            <a:r>
-              <a:rPr sz="1600" dirty="0">
-                <a:latin typeface="Courier"/>
-              </a:rPr>
-              <a:t>,] </a:t>
-            </a:r>
-            <a:r>
-              <a:rPr sz="1600" dirty="0">
-                <a:solidFill>
-                  <a:srgbClr val="666666"/>
-                </a:solidFill>
-                <a:latin typeface="Courier"/>
-              </a:rPr>
-              <a:t>+</a:t>
-            </a:r>
-            <a:br>
-              <a:rPr sz="1600" dirty="0">
-                <a:latin typeface="Courier"/>
-              </a:rPr>
-            </a:br>
-            <a:r>
-              <a:rPr sz="1600" dirty="0">
-                <a:solidFill>
-                  <a:srgbClr val="4070A0"/>
-                </a:solidFill>
-                <a:latin typeface="Courier"/>
-              </a:rPr>
               <a:t>    </a:t>
             </a:r>
             <a:r>
@@ -4359,28 +4326,69 @@
               <a:t>[</a:t>
             </a:r>
             <a:r>
+              <a:rPr lang="en-GB" sz="1600" dirty="0" err="1">
+                <a:latin typeface="Courier"/>
+              </a:rPr>
+              <a:t>i</a:t>
+            </a:r>
+            <a:r>
+              <a:rPr sz="1600" dirty="0">
+                <a:latin typeface="Courier"/>
+              </a:rPr>
+              <a:t>],</a:t>
+            </a:r>
+            <a:br>
+              <a:rPr sz="1600" dirty="0">
+                <a:latin typeface="Courier"/>
+              </a:rPr>
+            </a:br>
+            <a:r>
+              <a:rPr sz="1600" dirty="0">
+                <a:latin typeface="Courier"/>
+              </a:rPr>
+              <a:t>               </a:t>
+            </a:r>
+            <a:r>
+              <a:rPr lang="en-GB" sz="1600" dirty="0">
+                <a:latin typeface="Courier"/>
+              </a:rPr>
+              <a:t>y     = </a:t>
+            </a:r>
+            <a:r>
               <a:rPr sz="1600" dirty="0" err="1">
                 <a:latin typeface="Courier"/>
               </a:rPr>
+              <a:t>y_sir</a:t>
+            </a:r>
+            <a:r>
+              <a:rPr sz="1600" dirty="0">
+                <a:latin typeface="Courier"/>
+              </a:rPr>
+              <a:t>[</a:t>
+            </a:r>
+            <a:r>
+              <a:rPr lang="en-GB" sz="1600" dirty="0" err="1">
+                <a:latin typeface="Courier"/>
+              </a:rPr>
               <a:t>i</a:t>
             </a:r>
             <a:r>
-              <a:rPr sz="1600" dirty="0">
+              <a:rPr lang="en-GB" sz="1600" dirty="0">
                 <a:latin typeface="Courier"/>
               </a:rPr>
               <a:t> </a:t>
             </a:r>
             <a:r>
-              <a:rPr sz="1600" dirty="0">
+              <a:rPr lang="en-GB" sz="1600" dirty="0">
                 <a:solidFill>
                   <a:srgbClr val="666666"/>
                 </a:solidFill>
                 <a:latin typeface="Courier"/>
               </a:rPr>
-              <a:t>+</a:t>
-            </a:r>
-            <a:r>
-              <a:rPr sz="1600" dirty="0">
+              <a:t>-</a:t>
+            </a:r>
+            <a:r>
+              <a:rPr lang="en-GB" sz="1600" dirty="0">
                 <a:solidFill>
                   <a:srgbClr val="4070A0"/>
                 </a:solidFill>
@@ -4389,54 +4397,13 @@
               <a:t> </a:t>
             </a:r>
             <a:r>
-              <a:rPr sz="1600" dirty="0">
+              <a:rPr lang="en-GB" sz="1600" dirty="0">
                 <a:solidFill>
                   <a:srgbClr val="40A070"/>
                 </a:solidFill>
                 <a:latin typeface="Courier"/>
               </a:rPr>
               <a:t>1</a:t>
-            </a:r>
-            <a:r>
-              <a:rPr sz="1600" dirty="0">
-                <a:latin typeface="Courier"/>
-              </a:rPr>
-              <a:t>],</a:t>
-            </a:r>
-            <a:br>
-              <a:rPr sz="1600" dirty="0">
-                <a:latin typeface="Courier"/>
-              </a:rPr>
-            </a:br>
-            <a:r>
-              <a:rPr sz="1600" dirty="0">
-                <a:latin typeface="Courier"/>
-              </a:rPr>
-              <a:t>               </a:t>
-            </a:r>
-            <a:r>
-              <a:rPr lang="en-GB" sz="1600" dirty="0">
-                <a:latin typeface="Courier"/>
-              </a:rPr>
-              <a:t>y     = </a:t>
-            </a:r>
-            <a:r>
-              <a:rPr sz="1600" dirty="0" err="1">
-                <a:latin typeface="Courier"/>
-              </a:rPr>
-              <a:t>y_sir</a:t>
-            </a:r>
-            <a:r>
-              <a:rPr sz="1600" dirty="0">
-                <a:latin typeface="Courier"/>
-              </a:rPr>
-              <a:t>[</a:t>
-            </a:r>
-            <a:r>
-              <a:rPr sz="1600" dirty="0" err="1">
-                <a:latin typeface="Courier"/>
-              </a:rPr>
-              <a:t>i</a:t>
             </a:r>
             <a:r>
               <a:rPr sz="1600" dirty="0">
@@ -5501,8 +5468,8 @@
           </a:p>
         </p:txBody>
       </p:sp>
-      <mc:AlternateContent xmlns:mc="http://schemas.openxmlformats.org/markup-compatibility/2006">
-        <mc:Choice xmlns:a14="http://schemas.microsoft.com/office/drawing/2010/main" Requires="a14">
+      <mc:AlternateContent xmlns:mc="http://schemas.openxmlformats.org/markup-compatibility/2006" xmlns:a14="http://schemas.microsoft.com/office/drawing/2010/main">
+        <mc:Choice Requires="a14">
           <p:sp>
             <p:nvSpPr>
               <p:cNvPr id="3" name="Content Placeholder 2"/>
@@ -5904,7 +5871,7 @@
             </p:txBody>
           </p:sp>
         </mc:Choice>
-        <mc:Fallback>
+        <mc:Fallback xmlns="">
           <p:sp>
             <p:nvSpPr>
               <p:cNvPr id="3" name="Content Placeholder 2"/>
@@ -7692,8 +7659,8 @@
           </a:p>
         </p:txBody>
       </p:sp>
-      <mc:AlternateContent xmlns:mc="http://schemas.openxmlformats.org/markup-compatibility/2006">
-        <mc:Choice xmlns:a14="http://schemas.microsoft.com/office/drawing/2010/main" Requires="a14">
+      <mc:AlternateContent xmlns:mc="http://schemas.openxmlformats.org/markup-compatibility/2006" xmlns:a14="http://schemas.microsoft.com/office/drawing/2010/main">
+        <mc:Choice Requires="a14">
           <p:sp>
             <p:nvSpPr>
               <p:cNvPr id="3" name="Content Placeholder 2"/>
@@ -8044,7 +8011,7 @@
             </p:txBody>
           </p:sp>
         </mc:Choice>
-        <mc:Fallback>
+        <mc:Fallback xmlns="">
           <p:sp>
             <p:nvSpPr>
               <p:cNvPr id="3" name="Content Placeholder 2"/>
@@ -8629,8 +8596,8 @@
           </a:p>
         </p:txBody>
       </p:sp>
-      <mc:AlternateContent xmlns:mc="http://schemas.openxmlformats.org/markup-compatibility/2006">
-        <mc:Choice xmlns:a14="http://schemas.microsoft.com/office/drawing/2010/main" Requires="a14">
+      <mc:AlternateContent xmlns:mc="http://schemas.openxmlformats.org/markup-compatibility/2006" xmlns:a14="http://schemas.microsoft.com/office/drawing/2010/main">
+        <mc:Choice Requires="a14">
           <p:sp>
             <p:nvSpPr>
               <p:cNvPr id="3" name="Content Placeholder 2"/>
@@ -8881,7 +8848,7 @@
             </p:txBody>
           </p:sp>
         </mc:Choice>
-        <mc:Fallback>
+        <mc:Fallback xmlns="">
           <p:sp>
             <p:nvSpPr>
               <p:cNvPr id="3" name="Content Placeholder 2"/>
@@ -9001,8 +8968,8 @@
           </a:p>
         </p:txBody>
       </p:sp>
-      <mc:AlternateContent xmlns:mc="http://schemas.openxmlformats.org/markup-compatibility/2006">
-        <mc:Choice xmlns:a14="http://schemas.microsoft.com/office/drawing/2010/main" Requires="a14">
+      <mc:AlternateContent xmlns:mc="http://schemas.openxmlformats.org/markup-compatibility/2006" xmlns:a14="http://schemas.microsoft.com/office/drawing/2010/main">
+        <mc:Choice Requires="a14">
           <p:sp>
             <p:nvSpPr>
               <p:cNvPr id="3" name="Content Placeholder 2"/>
@@ -9348,7 +9315,7 @@
             </p:txBody>
           </p:sp>
         </mc:Choice>
-        <mc:Fallback>
+        <mc:Fallback xmlns="">
           <p:sp>
             <p:nvSpPr>
               <p:cNvPr id="3" name="Content Placeholder 2"/>

</xml_diff>